<commit_message>
some corrections on Ch 5
</commit_message>
<xml_diff>
--- a/DBDesign/5_LearningfromDataModel.pptx
+++ b/DBDesign/5_LearningfromDataModel.pptx
@@ -3268,7 +3268,7 @@
           <a:p>
             <a:fld id="{670FF0DC-4CC6-E74B-ADE9-A3A724E54A70}" type="datetime1">
               <a:rPr lang="en-US" smtClean="0"/>
-              <a:t>3/3/19</a:t>
+              <a:t>3/12/19</a:t>
             </a:fld>
             <a:endParaRPr lang="en-US"/>
           </a:p>
@@ -3526,7 +3526,7 @@
           <a:p>
             <a:fld id="{F1FDBABF-E9B9-0B48-88BB-0E26979FE3C3}" type="datetime1">
               <a:rPr lang="en-US" smtClean="0"/>
-              <a:t>3/3/19</a:t>
+              <a:t>3/12/19</a:t>
             </a:fld>
             <a:endParaRPr lang="en-US"/>
           </a:p>
@@ -3725,7 +3725,7 @@
           <a:p>
             <a:fld id="{F1FDBABF-E9B9-0B48-88BB-0E26979FE3C3}" type="datetime1">
               <a:rPr lang="en-US" smtClean="0"/>
-              <a:t>3/3/19</a:t>
+              <a:t>3/12/19</a:t>
             </a:fld>
             <a:endParaRPr lang="en-US"/>
           </a:p>
@@ -4294,7 +4294,7 @@
           <a:p>
             <a:fld id="{1F61FEA7-45D8-2D44-B4D3-34CB831CBB98}" type="datetimeFigureOut">
               <a:rPr lang="en-US" smtClean="0"/>
-              <a:t>3/3/19</a:t>
+              <a:t>3/12/19</a:t>
             </a:fld>
             <a:endParaRPr lang="en-US"/>
           </a:p>
@@ -4598,7 +4598,7 @@
           <a:p>
             <a:fld id="{096CA4E7-51A4-4043-B144-32E78EB53B2F}" type="datetime1">
               <a:rPr lang="en-US" smtClean="0"/>
-              <a:t>3/3/19</a:t>
+              <a:t>3/12/19</a:t>
             </a:fld>
             <a:endParaRPr lang="en-US"/>
           </a:p>
@@ -7891,6 +7891,33 @@
                                   </p:childTnLst>
                                 </p:cTn>
                               </p:par>
+                              <p:par>
+                                <p:cTn id="10" presetID="1" presetClass="entr" presetSubtype="0" fill="hold" nodeType="withEffect">
+                                  <p:stCondLst>
+                                    <p:cond delay="0"/>
+                                  </p:stCondLst>
+                                  <p:childTnLst>
+                                    <p:set>
+                                      <p:cBhvr>
+                                        <p:cTn id="11" dur="1" fill="hold">
+                                          <p:stCondLst>
+                                            <p:cond delay="0"/>
+                                          </p:stCondLst>
+                                        </p:cTn>
+                                        <p:tgtEl>
+                                          <p:spTgt spid="8"/>
+                                        </p:tgtEl>
+                                        <p:attrNameLst>
+                                          <p:attrName>style.visibility</p:attrName>
+                                        </p:attrNameLst>
+                                      </p:cBhvr>
+                                      <p:to>
+                                        <p:strVal val="visible"/>
+                                      </p:to>
+                                    </p:set>
+                                  </p:childTnLst>
+                                </p:cTn>
+                              </p:par>
                             </p:childTnLst>
                           </p:cTn>
                         </p:par>
@@ -8104,7 +8131,7 @@
                 <a:latin typeface="나눔고딕" panose="020D0604000000000000" pitchFamily="50" charset="-127"/>
                 <a:ea typeface="나눔고딕" panose="020D0604000000000000" pitchFamily="50" charset="-127"/>
               </a:rPr>
-              <a:t>이 데이터에이스에서 학생의 정의는</a:t>
+              <a:t>이 데이터베이스에서 학생의 정의는</a:t>
             </a:r>
             <a:r>
               <a:rPr lang="en-US" altLang="ko-KR" sz="2800" dirty="0">
@@ -11920,7 +11947,7 @@
                 <a:latin typeface="나눔고딕" panose="020D0604000000000000" pitchFamily="50" charset="-127"/>
                 <a:ea typeface="나눔고딕" panose="020D0604000000000000" pitchFamily="50" charset="-127"/>
               </a:rPr>
-              <a:t>는 실제로 간과한 문제입니다</a:t>
+              <a:t>는 실제로 간과하는 문제입니다</a:t>
             </a:r>
             <a:r>
               <a:rPr lang="en-US" altLang="ko-KR" sz="3200" dirty="0">
@@ -11961,7 +11988,7 @@
                 <a:latin typeface="나눔고딕" panose="020D0604000000000000" pitchFamily="50" charset="-127"/>
                 <a:ea typeface="나눔고딕" panose="020D0604000000000000" pitchFamily="50" charset="-127"/>
               </a:rPr>
-              <a:t>그럼에도 불구하고 문제의 완전한 개혁을 보장하지는 않지만 그럼에도 불구하고 데이터베이스의 생명주기동안 나타날 수 있는 </a:t>
+              <a:t>문제의 완전한 해결책을 보장하지는 않지만 그럼에도 불구하고 데이터베이스의 생명주기동안 나타날 수 있는 </a:t>
             </a:r>
             <a:r>
               <a:rPr lang="en-US" altLang="ko-KR" sz="3200" dirty="0">
@@ -12869,18 +12896,11 @@
               <a:buChar char="•"/>
             </a:pPr>
             <a:r>
-              <a:rPr lang="en-US" altLang="ko-KR" sz="2400" dirty="0">
-                <a:latin typeface="나눔고딕" panose="020D0604000000000000" pitchFamily="50" charset="-127"/>
-                <a:ea typeface="나눔고딕" panose="020D0604000000000000" pitchFamily="50" charset="-127"/>
-              </a:rPr>
-              <a:t>This latter solution may be overkill when the majority of visits have stable weather conditions.</a:t>
-            </a:r>
-            <a:r>
               <a:rPr lang="ko-KR" altLang="en-US" sz="2400" dirty="0">
                 <a:latin typeface="나눔고딕" panose="020D0604000000000000" pitchFamily="50" charset="-127"/>
                 <a:ea typeface="나눔고딕" panose="020D0604000000000000" pitchFamily="50" charset="-127"/>
               </a:rPr>
-              <a:t> 후자의 해결책은 대부분의 방문이 안정된 기상 조건일 때에는 과도하다 할 수 있습니다</a:t>
+              <a:t>후자의 해결책은 대부분의 방문이 안정된 기상 조건일 때에는 과도하다 할 수 있습니다</a:t>
             </a:r>
             <a:r>
               <a:rPr lang="en-US" altLang="ko-KR" sz="2400" dirty="0">
@@ -13206,7 +13226,7 @@
                             </p:stCondLst>
                             <p:childTnLst>
                               <p:par>
-                                <p:cTn id="5" presetID="42" presetClass="entr" presetSubtype="0" fill="hold" grpId="0" nodeType="clickEffect">
+                                <p:cTn id="5" presetID="1" presetClass="entr" presetSubtype="0" fill="hold" nodeType="clickEffect">
                                   <p:stCondLst>
                                     <p:cond delay="0"/>
                                   </p:stCondLst>
@@ -13214,121 +13234,6 @@
                                     <p:set>
                                       <p:cBhvr>
                                         <p:cTn id="6" dur="1" fill="hold">
-                                          <p:stCondLst>
-                                            <p:cond delay="0"/>
-                                          </p:stCondLst>
-                                        </p:cTn>
-                                        <p:tgtEl>
-                                          <p:spTgt spid="3">
-                                            <p:txEl>
-                                              <p:pRg st="0" end="0"/>
-                                            </p:txEl>
-                                          </p:spTgt>
-                                        </p:tgtEl>
-                                        <p:attrNameLst>
-                                          <p:attrName>style.visibility</p:attrName>
-                                        </p:attrNameLst>
-                                      </p:cBhvr>
-                                      <p:to>
-                                        <p:strVal val="visible"/>
-                                      </p:to>
-                                    </p:set>
-                                    <p:animEffect transition="in" filter="fade">
-                                      <p:cBhvr>
-                                        <p:cTn id="7" dur="1000"/>
-                                        <p:tgtEl>
-                                          <p:spTgt spid="3">
-                                            <p:txEl>
-                                              <p:pRg st="0" end="0"/>
-                                            </p:txEl>
-                                          </p:spTgt>
-                                        </p:tgtEl>
-                                      </p:cBhvr>
-                                    </p:animEffect>
-                                    <p:anim calcmode="lin" valueType="num">
-                                      <p:cBhvr>
-                                        <p:cTn id="8" dur="1000" fill="hold"/>
-                                        <p:tgtEl>
-                                          <p:spTgt spid="3">
-                                            <p:txEl>
-                                              <p:pRg st="0" end="0"/>
-                                            </p:txEl>
-                                          </p:spTgt>
-                                        </p:tgtEl>
-                                        <p:attrNameLst>
-                                          <p:attrName>ppt_x</p:attrName>
-                                        </p:attrNameLst>
-                                      </p:cBhvr>
-                                      <p:tavLst>
-                                        <p:tav tm="0">
-                                          <p:val>
-                                            <p:strVal val="#ppt_x"/>
-                                          </p:val>
-                                        </p:tav>
-                                        <p:tav tm="100000">
-                                          <p:val>
-                                            <p:strVal val="#ppt_x"/>
-                                          </p:val>
-                                        </p:tav>
-                                      </p:tavLst>
-                                    </p:anim>
-                                    <p:anim calcmode="lin" valueType="num">
-                                      <p:cBhvr>
-                                        <p:cTn id="9" dur="1000" fill="hold"/>
-                                        <p:tgtEl>
-                                          <p:spTgt spid="3">
-                                            <p:txEl>
-                                              <p:pRg st="0" end="0"/>
-                                            </p:txEl>
-                                          </p:spTgt>
-                                        </p:tgtEl>
-                                        <p:attrNameLst>
-                                          <p:attrName>ppt_y</p:attrName>
-                                        </p:attrNameLst>
-                                      </p:cBhvr>
-                                      <p:tavLst>
-                                        <p:tav tm="0">
-                                          <p:val>
-                                            <p:strVal val="#ppt_y+.1"/>
-                                          </p:val>
-                                        </p:tav>
-                                        <p:tav tm="100000">
-                                          <p:val>
-                                            <p:strVal val="#ppt_y"/>
-                                          </p:val>
-                                        </p:tav>
-                                      </p:tavLst>
-                                    </p:anim>
-                                  </p:childTnLst>
-                                </p:cTn>
-                              </p:par>
-                            </p:childTnLst>
-                          </p:cTn>
-                        </p:par>
-                      </p:childTnLst>
-                    </p:cTn>
-                  </p:par>
-                  <p:par>
-                    <p:cTn id="10" fill="hold">
-                      <p:stCondLst>
-                        <p:cond delay="indefinite"/>
-                      </p:stCondLst>
-                      <p:childTnLst>
-                        <p:par>
-                          <p:cTn id="11" fill="hold">
-                            <p:stCondLst>
-                              <p:cond delay="0"/>
-                            </p:stCondLst>
-                            <p:childTnLst>
-                              <p:par>
-                                <p:cTn id="12" presetID="1" presetClass="entr" presetSubtype="0" fill="hold" nodeType="clickEffect">
-                                  <p:stCondLst>
-                                    <p:cond delay="0"/>
-                                  </p:stCondLst>
-                                  <p:childTnLst>
-                                    <p:set>
-                                      <p:cBhvr>
-                                        <p:cTn id="13" dur="1" fill="hold">
                                           <p:stCondLst>
                                             <p:cond delay="0"/>
                                           </p:stCondLst>
@@ -13354,26 +13259,26 @@
                     </p:cTn>
                   </p:par>
                   <p:par>
-                    <p:cTn id="14" fill="hold">
+                    <p:cTn id="7" fill="hold">
                       <p:stCondLst>
                         <p:cond delay="indefinite"/>
                       </p:stCondLst>
                       <p:childTnLst>
                         <p:par>
-                          <p:cTn id="15" fill="hold">
+                          <p:cTn id="8" fill="hold">
                             <p:stCondLst>
                               <p:cond delay="0"/>
                             </p:stCondLst>
                             <p:childTnLst>
                               <p:par>
-                                <p:cTn id="16" presetID="42" presetClass="entr" presetSubtype="0" fill="hold" grpId="0" nodeType="clickEffect">
+                                <p:cTn id="9" presetID="1" presetClass="entr" presetSubtype="0" fill="hold" nodeType="clickEffect">
                                   <p:stCondLst>
                                     <p:cond delay="0"/>
                                   </p:stCondLst>
                                   <p:childTnLst>
                                     <p:set>
                                       <p:cBhvr>
-                                        <p:cTn id="17" dur="1" fill="hold">
+                                        <p:cTn id="10" dur="1" fill="hold">
                                           <p:stCondLst>
                                             <p:cond delay="0"/>
                                           </p:stCondLst>
@@ -13393,72 +13298,6 @@
                                         <p:strVal val="visible"/>
                                       </p:to>
                                     </p:set>
-                                    <p:animEffect transition="in" filter="fade">
-                                      <p:cBhvr>
-                                        <p:cTn id="18" dur="1000"/>
-                                        <p:tgtEl>
-                                          <p:spTgt spid="3">
-                                            <p:txEl>
-                                              <p:pRg st="1" end="1"/>
-                                            </p:txEl>
-                                          </p:spTgt>
-                                        </p:tgtEl>
-                                      </p:cBhvr>
-                                    </p:animEffect>
-                                    <p:anim calcmode="lin" valueType="num">
-                                      <p:cBhvr>
-                                        <p:cTn id="19" dur="1000" fill="hold"/>
-                                        <p:tgtEl>
-                                          <p:spTgt spid="3">
-                                            <p:txEl>
-                                              <p:pRg st="1" end="1"/>
-                                            </p:txEl>
-                                          </p:spTgt>
-                                        </p:tgtEl>
-                                        <p:attrNameLst>
-                                          <p:attrName>ppt_x</p:attrName>
-                                        </p:attrNameLst>
-                                      </p:cBhvr>
-                                      <p:tavLst>
-                                        <p:tav tm="0">
-                                          <p:val>
-                                            <p:strVal val="#ppt_x"/>
-                                          </p:val>
-                                        </p:tav>
-                                        <p:tav tm="100000">
-                                          <p:val>
-                                            <p:strVal val="#ppt_x"/>
-                                          </p:val>
-                                        </p:tav>
-                                      </p:tavLst>
-                                    </p:anim>
-                                    <p:anim calcmode="lin" valueType="num">
-                                      <p:cBhvr>
-                                        <p:cTn id="20" dur="1000" fill="hold"/>
-                                        <p:tgtEl>
-                                          <p:spTgt spid="3">
-                                            <p:txEl>
-                                              <p:pRg st="1" end="1"/>
-                                            </p:txEl>
-                                          </p:spTgt>
-                                        </p:tgtEl>
-                                        <p:attrNameLst>
-                                          <p:attrName>ppt_y</p:attrName>
-                                        </p:attrNameLst>
-                                      </p:cBhvr>
-                                      <p:tavLst>
-                                        <p:tav tm="0">
-                                          <p:val>
-                                            <p:strVal val="#ppt_y+.1"/>
-                                          </p:val>
-                                        </p:tav>
-                                        <p:tav tm="100000">
-                                          <p:val>
-                                            <p:strVal val="#ppt_y"/>
-                                          </p:val>
-                                        </p:tav>
-                                      </p:tavLst>
-                                    </p:anim>
                                   </p:childTnLst>
                                 </p:cTn>
                               </p:par>
@@ -13469,26 +13308,26 @@
                     </p:cTn>
                   </p:par>
                   <p:par>
-                    <p:cTn id="21" fill="hold">
+                    <p:cTn id="11" fill="hold">
                       <p:stCondLst>
                         <p:cond delay="indefinite"/>
                       </p:stCondLst>
                       <p:childTnLst>
                         <p:par>
-                          <p:cTn id="22" fill="hold">
+                          <p:cTn id="12" fill="hold">
                             <p:stCondLst>
                               <p:cond delay="0"/>
                             </p:stCondLst>
                             <p:childTnLst>
                               <p:par>
-                                <p:cTn id="23" presetID="42" presetClass="entr" presetSubtype="0" fill="hold" grpId="0" nodeType="clickEffect">
+                                <p:cTn id="13" presetID="1" presetClass="entr" presetSubtype="0" fill="hold" nodeType="clickEffect">
                                   <p:stCondLst>
                                     <p:cond delay="0"/>
                                   </p:stCondLst>
                                   <p:childTnLst>
                                     <p:set>
                                       <p:cBhvr>
-                                        <p:cTn id="24" dur="1" fill="hold">
+                                        <p:cTn id="14" dur="1" fill="hold">
                                           <p:stCondLst>
                                             <p:cond delay="0"/>
                                           </p:stCondLst>
@@ -13508,72 +13347,6 @@
                                         <p:strVal val="visible"/>
                                       </p:to>
                                     </p:set>
-                                    <p:animEffect transition="in" filter="fade">
-                                      <p:cBhvr>
-                                        <p:cTn id="25" dur="1000"/>
-                                        <p:tgtEl>
-                                          <p:spTgt spid="3">
-                                            <p:txEl>
-                                              <p:pRg st="2" end="2"/>
-                                            </p:txEl>
-                                          </p:spTgt>
-                                        </p:tgtEl>
-                                      </p:cBhvr>
-                                    </p:animEffect>
-                                    <p:anim calcmode="lin" valueType="num">
-                                      <p:cBhvr>
-                                        <p:cTn id="26" dur="1000" fill="hold"/>
-                                        <p:tgtEl>
-                                          <p:spTgt spid="3">
-                                            <p:txEl>
-                                              <p:pRg st="2" end="2"/>
-                                            </p:txEl>
-                                          </p:spTgt>
-                                        </p:tgtEl>
-                                        <p:attrNameLst>
-                                          <p:attrName>ppt_x</p:attrName>
-                                        </p:attrNameLst>
-                                      </p:cBhvr>
-                                      <p:tavLst>
-                                        <p:tav tm="0">
-                                          <p:val>
-                                            <p:strVal val="#ppt_x"/>
-                                          </p:val>
-                                        </p:tav>
-                                        <p:tav tm="100000">
-                                          <p:val>
-                                            <p:strVal val="#ppt_x"/>
-                                          </p:val>
-                                        </p:tav>
-                                      </p:tavLst>
-                                    </p:anim>
-                                    <p:anim calcmode="lin" valueType="num">
-                                      <p:cBhvr>
-                                        <p:cTn id="27" dur="1000" fill="hold"/>
-                                        <p:tgtEl>
-                                          <p:spTgt spid="3">
-                                            <p:txEl>
-                                              <p:pRg st="2" end="2"/>
-                                            </p:txEl>
-                                          </p:spTgt>
-                                        </p:tgtEl>
-                                        <p:attrNameLst>
-                                          <p:attrName>ppt_y</p:attrName>
-                                        </p:attrNameLst>
-                                      </p:cBhvr>
-                                      <p:tavLst>
-                                        <p:tav tm="0">
-                                          <p:val>
-                                            <p:strVal val="#ppt_y+.1"/>
-                                          </p:val>
-                                        </p:tav>
-                                        <p:tav tm="100000">
-                                          <p:val>
-                                            <p:strVal val="#ppt_y"/>
-                                          </p:val>
-                                        </p:tav>
-                                      </p:tavLst>
-                                    </p:anim>
                                   </p:childTnLst>
                                 </p:cTn>
                               </p:par>
@@ -13584,26 +13357,26 @@
                     </p:cTn>
                   </p:par>
                   <p:par>
-                    <p:cTn id="28" fill="hold">
+                    <p:cTn id="15" fill="hold">
                       <p:stCondLst>
                         <p:cond delay="indefinite"/>
                       </p:stCondLst>
                       <p:childTnLst>
                         <p:par>
-                          <p:cTn id="29" fill="hold">
+                          <p:cTn id="16" fill="hold">
                             <p:stCondLst>
                               <p:cond delay="0"/>
                             </p:stCondLst>
                             <p:childTnLst>
                               <p:par>
-                                <p:cTn id="30" presetID="42" presetClass="entr" presetSubtype="0" fill="hold" grpId="0" nodeType="clickEffect">
+                                <p:cTn id="17" presetID="1" presetClass="entr" presetSubtype="0" fill="hold" nodeType="clickEffect">
                                   <p:stCondLst>
                                     <p:cond delay="0"/>
                                   </p:stCondLst>
                                   <p:childTnLst>
                                     <p:set>
                                       <p:cBhvr>
-                                        <p:cTn id="31" dur="1" fill="hold">
+                                        <p:cTn id="18" dur="1" fill="hold">
                                           <p:stCondLst>
                                             <p:cond delay="0"/>
                                           </p:stCondLst>
@@ -13623,72 +13396,6 @@
                                         <p:strVal val="visible"/>
                                       </p:to>
                                     </p:set>
-                                    <p:animEffect transition="in" filter="fade">
-                                      <p:cBhvr>
-                                        <p:cTn id="32" dur="1000"/>
-                                        <p:tgtEl>
-                                          <p:spTgt spid="3">
-                                            <p:txEl>
-                                              <p:pRg st="3" end="3"/>
-                                            </p:txEl>
-                                          </p:spTgt>
-                                        </p:tgtEl>
-                                      </p:cBhvr>
-                                    </p:animEffect>
-                                    <p:anim calcmode="lin" valueType="num">
-                                      <p:cBhvr>
-                                        <p:cTn id="33" dur="1000" fill="hold"/>
-                                        <p:tgtEl>
-                                          <p:spTgt spid="3">
-                                            <p:txEl>
-                                              <p:pRg st="3" end="3"/>
-                                            </p:txEl>
-                                          </p:spTgt>
-                                        </p:tgtEl>
-                                        <p:attrNameLst>
-                                          <p:attrName>ppt_x</p:attrName>
-                                        </p:attrNameLst>
-                                      </p:cBhvr>
-                                      <p:tavLst>
-                                        <p:tav tm="0">
-                                          <p:val>
-                                            <p:strVal val="#ppt_x"/>
-                                          </p:val>
-                                        </p:tav>
-                                        <p:tav tm="100000">
-                                          <p:val>
-                                            <p:strVal val="#ppt_x"/>
-                                          </p:val>
-                                        </p:tav>
-                                      </p:tavLst>
-                                    </p:anim>
-                                    <p:anim calcmode="lin" valueType="num">
-                                      <p:cBhvr>
-                                        <p:cTn id="34" dur="1000" fill="hold"/>
-                                        <p:tgtEl>
-                                          <p:spTgt spid="3">
-                                            <p:txEl>
-                                              <p:pRg st="3" end="3"/>
-                                            </p:txEl>
-                                          </p:spTgt>
-                                        </p:tgtEl>
-                                        <p:attrNameLst>
-                                          <p:attrName>ppt_y</p:attrName>
-                                        </p:attrNameLst>
-                                      </p:cBhvr>
-                                      <p:tavLst>
-                                        <p:tav tm="0">
-                                          <p:val>
-                                            <p:strVal val="#ppt_y+.1"/>
-                                          </p:val>
-                                        </p:tav>
-                                        <p:tav tm="100000">
-                                          <p:val>
-                                            <p:strVal val="#ppt_y"/>
-                                          </p:val>
-                                        </p:tav>
-                                      </p:tavLst>
-                                    </p:anim>
                                   </p:childTnLst>
                                 </p:cTn>
                               </p:par>
@@ -13719,9 +13426,6 @@
         </p:cTn>
       </p:par>
     </p:tnLst>
-    <p:bldLst>
-      <p:bldP spid="3" grpId="0" build="p"/>
-    </p:bldLst>
   </p:timing>
 </p:sld>
 </file>
@@ -14840,27 +14544,7 @@
                 <a:latin typeface="나눔고딕" panose="020D0604000000000000" pitchFamily="50" charset="-127"/>
                 <a:ea typeface="나눔고딕" panose="020D0604000000000000" pitchFamily="50" charset="-127"/>
               </a:rPr>
-              <a:t>관계는 플레이어가 플레이 할 </a:t>
-            </a:r>
-            <a:r>
-              <a:rPr lang="ko-KR" altLang="en-US" sz="2400" b="0" dirty="0" err="1">
-                <a:solidFill>
-                  <a:schemeClr val="bg1"/>
-                </a:solidFill>
-                <a:latin typeface="나눔고딕" panose="020D0604000000000000" pitchFamily="50" charset="-127"/>
-                <a:ea typeface="나눔고딕" panose="020D0604000000000000" pitchFamily="50" charset="-127"/>
-              </a:rPr>
-              <a:t>수있는</a:t>
-            </a:r>
-            <a:r>
-              <a:rPr lang="ko-KR" altLang="en-US" sz="2400" b="0" dirty="0">
-                <a:solidFill>
-                  <a:schemeClr val="bg1"/>
-                </a:solidFill>
-                <a:latin typeface="나눔고딕" panose="020D0604000000000000" pitchFamily="50" charset="-127"/>
-                <a:ea typeface="나눔고딕" panose="020D0604000000000000" pitchFamily="50" charset="-127"/>
-              </a:rPr>
-              <a:t> </a:t>
+              <a:t>관계는 플레이어가 플레이 할 수 있는 </a:t>
             </a:r>
             <a:r>
               <a:rPr lang="ko-KR" altLang="en-US" sz="2400" b="0" dirty="0" err="1">
@@ -16105,14 +15789,7 @@
                 <a:latin typeface="나눔고딕" panose="020D0604000000000000" pitchFamily="50" charset="-127"/>
                 <a:ea typeface="나눔고딕" panose="020D0604000000000000" pitchFamily="50" charset="-127"/>
               </a:rPr>
-              <a:t>인 관계의 예는 </a:t>
-            </a:r>
-            <a:r>
-              <a:rPr lang="ko-KR" altLang="en-US" sz="3200" dirty="0" err="1">
-                <a:latin typeface="나눔고딕" panose="020D0604000000000000" pitchFamily="50" charset="-127"/>
-                <a:ea typeface="나눔고딕" panose="020D0604000000000000" pitchFamily="50" charset="-127"/>
-              </a:rPr>
-              <a:t>여럿있습니다</a:t>
+              <a:t>인 관계의 예는 여럿 있습니다</a:t>
             </a:r>
             <a:r>
               <a:rPr lang="en-US" altLang="ko-KR" sz="3200" dirty="0">
@@ -21774,27 +21451,7 @@
                 <a:latin typeface="나눔고딕" panose="020D0604000000000000" pitchFamily="50" charset="-127"/>
                 <a:ea typeface="나눔고딕" panose="020D0604000000000000" pitchFamily="50" charset="-127"/>
               </a:rPr>
-              <a:t>멤버는 시간에 따라 여러 팀에서 플레이 할 </a:t>
-            </a:r>
-            <a:r>
-              <a:rPr lang="ko-KR" altLang="en-US" sz="2400" b="0" dirty="0" err="1">
-                <a:solidFill>
-                  <a:schemeClr val="bg1"/>
-                </a:solidFill>
-                <a:latin typeface="나눔고딕" panose="020D0604000000000000" pitchFamily="50" charset="-127"/>
-                <a:ea typeface="나눔고딕" panose="020D0604000000000000" pitchFamily="50" charset="-127"/>
-              </a:rPr>
-              <a:t>수있기</a:t>
-            </a:r>
-            <a:r>
-              <a:rPr lang="ko-KR" altLang="en-US" sz="2400" b="0" dirty="0">
-                <a:solidFill>
-                  <a:schemeClr val="bg1"/>
-                </a:solidFill>
-                <a:latin typeface="나눔고딕" panose="020D0604000000000000" pitchFamily="50" charset="-127"/>
-                <a:ea typeface="나눔고딕" panose="020D0604000000000000" pitchFamily="50" charset="-127"/>
-              </a:rPr>
-              <a:t> 때문에</a:t>
+              <a:t>멤버는 시간에 따라 여러 팀에서 플레이 할 수 있기 때문에</a:t>
             </a:r>
             <a:r>
               <a:rPr lang="en-US" altLang="ko-KR" sz="2400" b="0" dirty="0">
@@ -24208,7 +23865,7 @@
                 <a:latin typeface="나눔고딕" panose="020D0604000000000000" pitchFamily="50" charset="-127"/>
                 <a:ea typeface="나눔고딕" panose="020D0604000000000000" pitchFamily="50" charset="-127"/>
               </a:rPr>
-              <a:t>특정 학생과 특정 과목을 수강하는 데 필요한 특별한 데이터가 있습니까</a:t>
+              <a:t>특정 학생이 특정 과목을 수강하는 데 필요한 특별한 데이터가 있습니까</a:t>
             </a:r>
             <a:r>
               <a:rPr lang="en-US" altLang="ko-KR" sz="2400" b="0" i="1" dirty="0">
@@ -29440,7 +29097,7 @@
                             </p:stCondLst>
                             <p:childTnLst>
                               <p:par>
-                                <p:cTn id="11" presetID="42" presetClass="entr" presetSubtype="0" fill="hold" grpId="0" nodeType="clickEffect">
+                                <p:cTn id="11" presetID="1" presetClass="entr" presetSubtype="0" fill="hold" nodeType="clickEffect">
                                   <p:stCondLst>
                                     <p:cond delay="0"/>
                                   </p:stCondLst>
@@ -29453,7 +29110,11 @@
                                           </p:stCondLst>
                                         </p:cTn>
                                         <p:tgtEl>
-                                          <p:spTgt spid="16"/>
+                                          <p:spTgt spid="16">
+                                            <p:txEl>
+                                              <p:pRg st="0" end="0"/>
+                                            </p:txEl>
+                                          </p:spTgt>
                                         </p:tgtEl>
                                         <p:attrNameLst>
                                           <p:attrName>style.visibility</p:attrName>
@@ -29463,60 +29124,153 @@
                                         <p:strVal val="visible"/>
                                       </p:to>
                                     </p:set>
-                                    <p:animEffect transition="in" filter="fade">
+                                  </p:childTnLst>
+                                </p:cTn>
+                              </p:par>
+                            </p:childTnLst>
+                          </p:cTn>
+                        </p:par>
+                      </p:childTnLst>
+                    </p:cTn>
+                  </p:par>
+                  <p:par>
+                    <p:cTn id="13" fill="hold">
+                      <p:stCondLst>
+                        <p:cond delay="indefinite"/>
+                      </p:stCondLst>
+                      <p:childTnLst>
+                        <p:par>
+                          <p:cTn id="14" fill="hold">
+                            <p:stCondLst>
+                              <p:cond delay="0"/>
+                            </p:stCondLst>
+                            <p:childTnLst>
+                              <p:par>
+                                <p:cTn id="15" presetID="1" presetClass="entr" presetSubtype="0" fill="hold" nodeType="clickEffect">
+                                  <p:stCondLst>
+                                    <p:cond delay="0"/>
+                                  </p:stCondLst>
+                                  <p:childTnLst>
+                                    <p:set>
                                       <p:cBhvr>
-                                        <p:cTn id="13" dur="1000"/>
+                                        <p:cTn id="16" dur="1" fill="hold">
+                                          <p:stCondLst>
+                                            <p:cond delay="0"/>
+                                          </p:stCondLst>
+                                        </p:cTn>
                                         <p:tgtEl>
-                                          <p:spTgt spid="16"/>
-                                        </p:tgtEl>
-                                      </p:cBhvr>
-                                    </p:animEffect>
-                                    <p:anim calcmode="lin" valueType="num">
-                                      <p:cBhvr>
-                                        <p:cTn id="14" dur="1000" fill="hold"/>
-                                        <p:tgtEl>
-                                          <p:spTgt spid="16"/>
+                                          <p:spTgt spid="16">
+                                            <p:txEl>
+                                              <p:pRg st="1" end="1"/>
+                                            </p:txEl>
+                                          </p:spTgt>
                                         </p:tgtEl>
                                         <p:attrNameLst>
-                                          <p:attrName>ppt_x</p:attrName>
+                                          <p:attrName>style.visibility</p:attrName>
                                         </p:attrNameLst>
                                       </p:cBhvr>
-                                      <p:tavLst>
-                                        <p:tav tm="0">
-                                          <p:val>
-                                            <p:strVal val="#ppt_x"/>
-                                          </p:val>
-                                        </p:tav>
-                                        <p:tav tm="100000">
-                                          <p:val>
-                                            <p:strVal val="#ppt_x"/>
-                                          </p:val>
-                                        </p:tav>
-                                      </p:tavLst>
-                                    </p:anim>
-                                    <p:anim calcmode="lin" valueType="num">
+                                      <p:to>
+                                        <p:strVal val="visible"/>
+                                      </p:to>
+                                    </p:set>
+                                  </p:childTnLst>
+                                </p:cTn>
+                              </p:par>
+                            </p:childTnLst>
+                          </p:cTn>
+                        </p:par>
+                      </p:childTnLst>
+                    </p:cTn>
+                  </p:par>
+                  <p:par>
+                    <p:cTn id="17" fill="hold">
+                      <p:stCondLst>
+                        <p:cond delay="indefinite"/>
+                      </p:stCondLst>
+                      <p:childTnLst>
+                        <p:par>
+                          <p:cTn id="18" fill="hold">
+                            <p:stCondLst>
+                              <p:cond delay="0"/>
+                            </p:stCondLst>
+                            <p:childTnLst>
+                              <p:par>
+                                <p:cTn id="19" presetID="1" presetClass="entr" presetSubtype="0" fill="hold" nodeType="clickEffect">
+                                  <p:stCondLst>
+                                    <p:cond delay="0"/>
+                                  </p:stCondLst>
+                                  <p:childTnLst>
+                                    <p:set>
                                       <p:cBhvr>
-                                        <p:cTn id="15" dur="1000" fill="hold"/>
+                                        <p:cTn id="20" dur="1" fill="hold">
+                                          <p:stCondLst>
+                                            <p:cond delay="0"/>
+                                          </p:stCondLst>
+                                        </p:cTn>
                                         <p:tgtEl>
-                                          <p:spTgt spid="16"/>
+                                          <p:spTgt spid="16">
+                                            <p:txEl>
+                                              <p:pRg st="2" end="2"/>
+                                            </p:txEl>
+                                          </p:spTgt>
                                         </p:tgtEl>
                                         <p:attrNameLst>
-                                          <p:attrName>ppt_y</p:attrName>
+                                          <p:attrName>style.visibility</p:attrName>
                                         </p:attrNameLst>
                                       </p:cBhvr>
-                                      <p:tavLst>
-                                        <p:tav tm="0">
-                                          <p:val>
-                                            <p:strVal val="#ppt_y+.1"/>
-                                          </p:val>
-                                        </p:tav>
-                                        <p:tav tm="100000">
-                                          <p:val>
-                                            <p:strVal val="#ppt_y"/>
-                                          </p:val>
-                                        </p:tav>
-                                      </p:tavLst>
-                                    </p:anim>
+                                      <p:to>
+                                        <p:strVal val="visible"/>
+                                      </p:to>
+                                    </p:set>
+                                  </p:childTnLst>
+                                </p:cTn>
+                              </p:par>
+                            </p:childTnLst>
+                          </p:cTn>
+                        </p:par>
+                      </p:childTnLst>
+                    </p:cTn>
+                  </p:par>
+                  <p:par>
+                    <p:cTn id="21" fill="hold">
+                      <p:stCondLst>
+                        <p:cond delay="indefinite"/>
+                      </p:stCondLst>
+                      <p:childTnLst>
+                        <p:par>
+                          <p:cTn id="22" fill="hold">
+                            <p:stCondLst>
+                              <p:cond delay="0"/>
+                            </p:stCondLst>
+                            <p:childTnLst>
+                              <p:par>
+                                <p:cTn id="23" presetID="1" presetClass="entr" presetSubtype="0" fill="hold" nodeType="clickEffect">
+                                  <p:stCondLst>
+                                    <p:cond delay="0"/>
+                                  </p:stCondLst>
+                                  <p:childTnLst>
+                                    <p:set>
+                                      <p:cBhvr>
+                                        <p:cTn id="24" dur="1" fill="hold">
+                                          <p:stCondLst>
+                                            <p:cond delay="0"/>
+                                          </p:stCondLst>
+                                        </p:cTn>
+                                        <p:tgtEl>
+                                          <p:spTgt spid="16">
+                                            <p:txEl>
+                                              <p:pRg st="3" end="3"/>
+                                            </p:txEl>
+                                          </p:spTgt>
+                                        </p:tgtEl>
+                                        <p:attrNameLst>
+                                          <p:attrName>style.visibility</p:attrName>
+                                        </p:attrNameLst>
+                                      </p:cBhvr>
+                                      <p:to>
+                                        <p:strVal val="visible"/>
+                                      </p:to>
+                                    </p:set>
                                   </p:childTnLst>
                                 </p:cTn>
                               </p:par>
@@ -29549,7 +29303,6 @@
     </p:tnLst>
     <p:bldLst>
       <p:bldP spid="3" grpId="0" build="p"/>
-      <p:bldP spid="16" grpId="0"/>
     </p:bldLst>
   </p:timing>
 </p:sld>
@@ -35769,6 +35522,33 @@
                                         </p:tav>
                                       </p:tavLst>
                                     </p:anim>
+                                  </p:childTnLst>
+                                </p:cTn>
+                              </p:par>
+                              <p:par>
+                                <p:cTn id="10" presetID="1" presetClass="entr" presetSubtype="0" fill="hold" nodeType="withEffect">
+                                  <p:stCondLst>
+                                    <p:cond delay="0"/>
+                                  </p:stCondLst>
+                                  <p:childTnLst>
+                                    <p:set>
+                                      <p:cBhvr>
+                                        <p:cTn id="11" dur="1" fill="hold">
+                                          <p:stCondLst>
+                                            <p:cond delay="0"/>
+                                          </p:stCondLst>
+                                        </p:cTn>
+                                        <p:tgtEl>
+                                          <p:spTgt spid="29"/>
+                                        </p:tgtEl>
+                                        <p:attrNameLst>
+                                          <p:attrName>style.visibility</p:attrName>
+                                        </p:attrNameLst>
+                                      </p:cBhvr>
+                                      <p:to>
+                                        <p:strVal val="visible"/>
+                                      </p:to>
+                                    </p:set>
                                   </p:childTnLst>
                                 </p:cTn>
                               </p:par>

</xml_diff>